<commit_message>
Add some features and create v1 v2 dnn training
</commit_message>
<xml_diff>
--- a/imbd2022final-ProjectB/111052_projectB_report.pptx
+++ b/imbd2022final-ProjectB/111052_projectB_report.pptx
@@ -7970,10 +7970,7 @@
           </a:p>
           <a:p>
             <a:pPr lvl="1"/>
-            <a:r>
-              <a:rPr lang="en-US" altLang="zh-TW" dirty="0"/>
-              <a:t>0.0012</a:t>
-            </a:r>
+            <a:endParaRPr lang="en-US" altLang="zh-TW" dirty="0"/>
           </a:p>
           <a:p>
             <a:endParaRPr lang="en-US" altLang="zh-TW" dirty="0"/>
@@ -23784,15 +23781,43 @@
           <a:p>
             <a:r>
               <a:rPr lang="zh-TW" altLang="en-US" sz="2400" dirty="0"/>
-              <a:t>觀察得出下列特徵與磨耗最大值相關係數較高</a:t>
+              <a:t>觀察得出下列特徵與</a:t>
             </a:r>
-            <a:endParaRPr lang="en-US" altLang="zh-TW" sz="2400" dirty="0"/>
+            <a:r>
+              <a:rPr lang="zh-TW" altLang="en-US" sz="2400" u="sng" dirty="0"/>
+              <a:t>磨耗最大值</a:t>
+            </a:r>
+            <a:r>
+              <a:rPr lang="zh-TW" altLang="en-US" sz="2400" dirty="0"/>
+              <a:t>相關係數</a:t>
+            </a:r>
+            <a:r>
+              <a:rPr lang="zh-TW" altLang="en-US" sz="2400" u="sng" dirty="0"/>
+              <a:t>較高</a:t>
+            </a:r>
+            <a:endParaRPr lang="en-US" altLang="zh-TW" sz="2400" u="sng" dirty="0"/>
           </a:p>
           <a:p>
             <a:pPr lvl="1"/>
             <a:r>
               <a:rPr lang="en-US" altLang="zh-TW" sz="1800" dirty="0" err="1"/>
               <a:t>n_spike_B</a:t>
+            </a:r>
+            <a:r>
+              <a:rPr lang="zh-TW" altLang="en-US" sz="1800" dirty="0"/>
+              <a:t>、</a:t>
+            </a:r>
+            <a:r>
+              <a:rPr lang="en-US" altLang="zh-TW" sz="1800" dirty="0" err="1"/>
+              <a:t>n_spike_C</a:t>
+            </a:r>
+            <a:r>
+              <a:rPr lang="zh-TW" altLang="en-US" sz="1800" dirty="0"/>
+              <a:t>、</a:t>
+            </a:r>
+            <a:r>
+              <a:rPr lang="en-US" altLang="zh-TW" sz="1800" dirty="0" err="1"/>
+              <a:t>n_spike_D</a:t>
             </a:r>
             <a:r>
               <a:rPr lang="zh-TW" altLang="en-US" sz="1800" dirty="0"/>
@@ -23804,59 +23829,15 @@
             <a:pPr lvl="1"/>
             <a:r>
               <a:rPr lang="en-US" altLang="zh-TW" sz="1800" dirty="0" err="1"/>
-              <a:t>n_spike</a:t>
-            </a:r>
-            <a:r>
-              <a:rPr lang="en-US" altLang="zh-TW" sz="1800" dirty="0"/>
-              <a:t>_ C</a:t>
+              <a:t>n_spike_B</a:t>
             </a:r>
             <a:r>
               <a:rPr lang="zh-TW" altLang="en-US" sz="1800" dirty="0"/>
-              <a:t>總位移</a:t>
+              <a:t>、</a:t>
             </a:r>
-            <a:endParaRPr lang="en-US" altLang="zh-TW" sz="1800" dirty="0"/>
-          </a:p>
-          <a:p>
-            <a:pPr lvl="1"/>
             <a:r>
               <a:rPr lang="en-US" altLang="zh-TW" sz="1800" dirty="0" err="1"/>
-              <a:t>n_spike</a:t>
-            </a:r>
-            <a:r>
-              <a:rPr lang="en-US" altLang="zh-TW" sz="1800" dirty="0"/>
-              <a:t>_ D</a:t>
-            </a:r>
-            <a:r>
-              <a:rPr lang="zh-TW" altLang="en-US" sz="1800" dirty="0"/>
-              <a:t>總位移</a:t>
-            </a:r>
-            <a:endParaRPr lang="en-US" altLang="zh-TW" sz="1800" dirty="0"/>
-          </a:p>
-          <a:p>
-            <a:pPr lvl="1"/>
-            <a:r>
-              <a:rPr lang="en-US" altLang="zh-TW" sz="1800" dirty="0" err="1"/>
-              <a:t>n_spike</a:t>
-            </a:r>
-            <a:r>
-              <a:rPr lang="en-US" altLang="zh-TW" sz="1800" dirty="0"/>
-              <a:t>_ B</a:t>
-            </a:r>
-            <a:r>
-              <a:rPr lang="zh-TW" altLang="en-US" sz="1800" dirty="0"/>
-              <a:t>低雜訊總位移</a:t>
-            </a:r>
-            <a:endParaRPr lang="en-US" altLang="zh-TW" sz="1800" dirty="0"/>
-          </a:p>
-          <a:p>
-            <a:pPr lvl="1"/>
-            <a:r>
-              <a:rPr lang="en-US" altLang="zh-TW" sz="1800" dirty="0" err="1"/>
-              <a:t>n_spike</a:t>
-            </a:r>
-            <a:r>
-              <a:rPr lang="en-US" altLang="zh-TW" sz="1800" dirty="0"/>
-              <a:t>_ C</a:t>
+              <a:t>n_spike_C</a:t>
             </a:r>
             <a:r>
               <a:rPr lang="zh-TW" altLang="en-US" sz="1800" dirty="0"/>
@@ -23872,7 +23853,7 @@
             </a:r>
             <a:r>
               <a:rPr lang="zh-TW" altLang="en-US" sz="1800" dirty="0"/>
-              <a:t>與</a:t>
+              <a:t>絕對值與</a:t>
             </a:r>
             <a:r>
               <a:rPr lang="en-US" altLang="zh-TW" sz="1800" dirty="0" err="1"/>
@@ -23880,19 +23861,15 @@
             </a:r>
             <a:r>
               <a:rPr lang="zh-TW" altLang="en-US" sz="1800" dirty="0"/>
-              <a:t>相減總位移</a:t>
+              <a:t>、</a:t>
             </a:r>
-            <a:endParaRPr lang="en-US" altLang="zh-TW" sz="1800" dirty="0"/>
-          </a:p>
-          <a:p>
-            <a:pPr lvl="1"/>
             <a:r>
               <a:rPr lang="en-US" altLang="zh-TW" sz="1800" dirty="0" err="1"/>
               <a:t>n_sg_D</a:t>
             </a:r>
             <a:r>
               <a:rPr lang="zh-TW" altLang="en-US" sz="1800" dirty="0"/>
-              <a:t>與</a:t>
+              <a:t>絕對值與</a:t>
             </a:r>
             <a:r>
               <a:rPr lang="en-US" altLang="zh-TW" sz="1800" dirty="0" err="1"/>
@@ -23900,19 +23877,15 @@
             </a:r>
             <a:r>
               <a:rPr lang="zh-TW" altLang="en-US" sz="1800" dirty="0"/>
-              <a:t>相減總位移</a:t>
+              <a:t>相、</a:t>
             </a:r>
-            <a:endParaRPr lang="en-US" altLang="zh-TW" sz="1800" dirty="0"/>
-          </a:p>
-          <a:p>
-            <a:pPr lvl="1"/>
             <a:r>
               <a:rPr lang="en-US" altLang="zh-TW" sz="1800" dirty="0" err="1"/>
               <a:t>n_sg_F</a:t>
             </a:r>
             <a:r>
               <a:rPr lang="zh-TW" altLang="en-US" sz="1800" dirty="0"/>
-              <a:t>與</a:t>
+              <a:t>絕對值與</a:t>
             </a:r>
             <a:r>
               <a:rPr lang="en-US" altLang="zh-TW" sz="1800" dirty="0" err="1"/>
@@ -23926,6 +23899,68 @@
           </a:p>
           <a:p>
             <a:pPr lvl="1"/>
+            <a:r>
+              <a:rPr lang="en-US" altLang="zh-TW" sz="1800" dirty="0" err="1"/>
+              <a:t>n_sg_B</a:t>
+            </a:r>
+            <a:r>
+              <a:rPr lang="zh-TW" altLang="en-US" sz="1800" dirty="0"/>
+              <a:t>絕對值與</a:t>
+            </a:r>
+            <a:r>
+              <a:rPr lang="en-US" altLang="zh-TW" sz="1800" dirty="0" err="1"/>
+              <a:t>n_spike_B</a:t>
+            </a:r>
+            <a:r>
+              <a:rPr lang="zh-TW" altLang="en-US" sz="1800" dirty="0"/>
+              <a:t>、</a:t>
+            </a:r>
+            <a:r>
+              <a:rPr lang="en-US" altLang="zh-TW" sz="1800" dirty="0" err="1"/>
+              <a:t>n_sg_D</a:t>
+            </a:r>
+            <a:r>
+              <a:rPr lang="zh-TW" altLang="en-US" sz="1800" dirty="0"/>
+              <a:t>絕對值與</a:t>
+            </a:r>
+            <a:r>
+              <a:rPr lang="en-US" altLang="zh-TW" sz="1800" dirty="0" err="1"/>
+              <a:t>n_spike_C</a:t>
+            </a:r>
+            <a:r>
+              <a:rPr lang="zh-TW" altLang="en-US" sz="1800" dirty="0"/>
+              <a:t>相、</a:t>
+            </a:r>
+            <a:r>
+              <a:rPr lang="en-US" altLang="zh-TW" sz="1800" dirty="0" err="1"/>
+              <a:t>n_sg_F</a:t>
+            </a:r>
+            <a:r>
+              <a:rPr lang="zh-TW" altLang="en-US" sz="1800" dirty="0"/>
+              <a:t>絕對值與</a:t>
+            </a:r>
+            <a:r>
+              <a:rPr lang="en-US" altLang="zh-TW" sz="1800" dirty="0" err="1"/>
+              <a:t>n_spike_D</a:t>
+            </a:r>
+            <a:r>
+              <a:rPr lang="zh-TW" altLang="en-US" sz="1800" dirty="0"/>
+              <a:t>相乘累加</a:t>
+            </a:r>
+            <a:endParaRPr lang="en-US" altLang="zh-TW" sz="1800" dirty="0"/>
+          </a:p>
+          <a:p>
+            <a:pPr marL="457200" lvl="1" indent="0">
+              <a:buNone/>
+            </a:pPr>
+            <a:endParaRPr lang="en-US" altLang="zh-TW" sz="1800" dirty="0"/>
+          </a:p>
+          <a:p>
+            <a:pPr lvl="1"/>
+            <a:endParaRPr lang="en-US" altLang="zh-TW" sz="1800" dirty="0"/>
+          </a:p>
+          <a:p>
+            <a:pPr lvl="1"/>
             <a:endParaRPr lang="en-US" altLang="zh-TW" sz="1800" dirty="0"/>
           </a:p>
           <a:p>
@@ -23935,7 +23970,7 @@
             </a:r>
             <a:r>
               <a:rPr lang="en-US" altLang="zh-TW" sz="2400" dirty="0"/>
-              <a:t>shape(70, 8)</a:t>
+              <a:t>shape(70, 15)</a:t>
             </a:r>
             <a:r>
               <a:rPr lang="zh-TW" altLang="en-US" sz="2400" dirty="0"/>
@@ -25844,7 +25879,7 @@
           <p:nvPr>
             <p:extLst>
               <p:ext uri="{D42A27DB-BD31-4B8C-83A1-F6EECF244321}">
-                <p14:modId xmlns:p14="http://schemas.microsoft.com/office/powerpoint/2010/main" val="141520003"/>
+                <p14:modId xmlns:p14="http://schemas.microsoft.com/office/powerpoint/2010/main" val="246608790"/>
               </p:ext>
             </p:extLst>
           </p:nvPr>
@@ -25955,7 +25990,7 @@
                           <a:ea typeface="新細明體" panose="02020500000000000000" pitchFamily="18" charset="-120"/>
                           <a:cs typeface="新細明體" panose="02020500000000000000" pitchFamily="18" charset="-120"/>
                         </a:rPr>
-                        <a:t>Model: "sequential_0"</a:t>
+                        <a:t>Model: "sequential"</a:t>
                       </a:r>
                       <a:endParaRPr lang="zh-TW" sz="800" kern="100" dirty="0">
                         <a:effectLst/>

</xml_diff>